<commit_message>
Update to Azure Sysnapse Analytics
Rename "Azure SQL Data Warehouse" to "Azure Synapse Analytics" to reflect the rebranding fo the product.

This commit is for Issue #49
</commit_message>
<xml_diff>
--- a/Whiteboard design session/Modern Cloud Apps Preferred Solution.pptx
+++ b/Whiteboard design session/Modern Cloud Apps Preferred Solution.pptx
@@ -146,9 +146,7 @@
 
 <file path=ppt/commentAuthors.xml><?xml version="1.0" encoding="utf-8"?>
 <p:cmAuthorLst xmlns:a="http://schemas.openxmlformats.org/drawingml/2006/main" xmlns:r="http://schemas.openxmlformats.org/officeDocument/2006/relationships" xmlns:p="http://schemas.openxmlformats.org/presentationml/2006/main">
-  <p:cmAuthor id="1" name="Matthew Weatherly" initials="MW" lastIdx="3" clrIdx="0">
-    <p:extLst/>
-  </p:cmAuthor>
+  <p:cmAuthor id="1" name="Matthew Weatherly" initials="MW" lastIdx="3" clrIdx="0"/>
 </p:cmAuthorLst>
 </file>
 
@@ -238,7 +236,7 @@
               <a:rPr lang="en-US" smtClean="0">
                 <a:latin typeface="Segoe UI"/>
               </a:rPr>
-              <a:t>11/24/2018</a:t>
+              <a:t>1/29/20</a:t>
             </a:fld>
             <a:endParaRPr lang="en-US">
               <a:latin typeface="Segoe UI"/>
@@ -738,7 +736,7 @@
           <a:graphicData uri="http://schemas.openxmlformats.org/presentationml/2006/ole">
             <mc:AlternateContent xmlns:mc="http://schemas.openxmlformats.org/markup-compatibility/2006">
               <mc:Choice xmlns:v="urn:schemas-microsoft-com:vml" Requires="v">
-                <p:oleObj spid="_x0000_s11090" name="think-cell Slide" r:id="rId8" imgW="270" imgH="270" progId="TCLayout.ActiveDocument.1">
+                <p:oleObj spid="_x0000_s11092" name="think-cell Slide" r:id="rId8" imgW="270" imgH="270" progId="TCLayout.ActiveDocument.1">
                   <p:embed/>
                 </p:oleObj>
               </mc:Choice>
@@ -1094,7 +1092,7 @@
           <a:graphicData uri="http://schemas.openxmlformats.org/presentationml/2006/ole">
             <mc:AlternateContent xmlns:mc="http://schemas.openxmlformats.org/markup-compatibility/2006">
               <mc:Choice xmlns:v="urn:schemas-microsoft-com:vml" Requires="v">
-                <p:oleObj spid="_x0000_s20306" name="think-cell Slide" r:id="rId11" imgW="270" imgH="270" progId="TCLayout.ActiveDocument.1">
+                <p:oleObj spid="_x0000_s20308" name="think-cell Slide" r:id="rId11" imgW="270" imgH="270" progId="TCLayout.ActiveDocument.1">
                   <p:embed/>
                 </p:oleObj>
               </mc:Choice>
@@ -1594,7 +1592,7 @@
           <a:graphicData uri="http://schemas.openxmlformats.org/presentationml/2006/ole">
             <mc:AlternateContent xmlns:mc="http://schemas.openxmlformats.org/markup-compatibility/2006">
               <mc:Choice xmlns:v="urn:schemas-microsoft-com:vml" Requires="v">
-                <p:oleObj spid="_x0000_s21330" name="think-cell Slide" r:id="rId11" imgW="270" imgH="270" progId="TCLayout.ActiveDocument.1">
+                <p:oleObj spid="_x0000_s21332" name="think-cell Slide" r:id="rId11" imgW="270" imgH="270" progId="TCLayout.ActiveDocument.1">
                   <p:embed/>
                 </p:oleObj>
               </mc:Choice>
@@ -2138,7 +2136,7 @@
           <a:graphicData uri="http://schemas.openxmlformats.org/presentationml/2006/ole">
             <mc:AlternateContent xmlns:mc="http://schemas.openxmlformats.org/markup-compatibility/2006">
               <mc:Choice xmlns:v="urn:schemas-microsoft-com:vml" Requires="v">
-                <p:oleObj spid="_x0000_s22354" name="think-cell Slide" r:id="rId9" imgW="270" imgH="270" progId="TCLayout.ActiveDocument.1">
+                <p:oleObj spid="_x0000_s22356" name="think-cell Slide" r:id="rId9" imgW="270" imgH="270" progId="TCLayout.ActiveDocument.1">
                   <p:embed/>
                 </p:oleObj>
               </mc:Choice>
@@ -2520,7 +2518,7 @@
           <a:graphicData uri="http://schemas.openxmlformats.org/presentationml/2006/ole">
             <mc:AlternateContent xmlns:mc="http://schemas.openxmlformats.org/markup-compatibility/2006">
               <mc:Choice xmlns:v="urn:schemas-microsoft-com:vml" Requires="v">
-                <p:oleObj spid="_x0000_s23378" name="think-cell Slide" r:id="rId12" imgW="270" imgH="270" progId="TCLayout.ActiveDocument.1">
+                <p:oleObj spid="_x0000_s23380" name="think-cell Slide" r:id="rId12" imgW="270" imgH="270" progId="TCLayout.ActiveDocument.1">
                   <p:embed/>
                 </p:oleObj>
               </mc:Choice>
@@ -3016,7 +3014,7 @@
           <a:graphicData uri="http://schemas.openxmlformats.org/presentationml/2006/ole">
             <mc:AlternateContent xmlns:mc="http://schemas.openxmlformats.org/markup-compatibility/2006">
               <mc:Choice xmlns:v="urn:schemas-microsoft-com:vml" Requires="v">
-                <p:oleObj spid="_x0000_s24402" name="think-cell Slide" r:id="rId12" imgW="270" imgH="270" progId="TCLayout.ActiveDocument.1">
+                <p:oleObj spid="_x0000_s24404" name="think-cell Slide" r:id="rId12" imgW="270" imgH="270" progId="TCLayout.ActiveDocument.1">
                   <p:embed/>
                 </p:oleObj>
               </mc:Choice>
@@ -3520,7 +3518,7 @@
           <a:graphicData uri="http://schemas.openxmlformats.org/presentationml/2006/ole">
             <mc:AlternateContent xmlns:mc="http://schemas.openxmlformats.org/markup-compatibility/2006">
               <mc:Choice xmlns:v="urn:schemas-microsoft-com:vml" Requires="v">
-                <p:oleObj spid="_x0000_s25426" name="think-cell Slide" r:id="rId7" imgW="270" imgH="270" progId="TCLayout.ActiveDocument.1">
+                <p:oleObj spid="_x0000_s25428" name="think-cell Slide" r:id="rId7" imgW="270" imgH="270" progId="TCLayout.ActiveDocument.1">
                   <p:embed/>
                 </p:oleObj>
               </mc:Choice>
@@ -3814,7 +3812,7 @@
           <a:graphicData uri="http://schemas.openxmlformats.org/presentationml/2006/ole">
             <mc:AlternateContent xmlns:mc="http://schemas.openxmlformats.org/markup-compatibility/2006">
               <mc:Choice xmlns:v="urn:schemas-microsoft-com:vml" Requires="v">
-                <p:oleObj spid="_x0000_s26450" name="think-cell Slide" r:id="rId9" imgW="270" imgH="270" progId="TCLayout.ActiveDocument.1">
+                <p:oleObj spid="_x0000_s26452" name="think-cell Slide" r:id="rId9" imgW="270" imgH="270" progId="TCLayout.ActiveDocument.1">
                   <p:embed/>
                 </p:oleObj>
               </mc:Choice>
@@ -4179,7 +4177,7 @@
           <a:graphicData uri="http://schemas.openxmlformats.org/presentationml/2006/ole">
             <mc:AlternateContent xmlns:mc="http://schemas.openxmlformats.org/markup-compatibility/2006">
               <mc:Choice xmlns:v="urn:schemas-microsoft-com:vml" Requires="v">
-                <p:oleObj spid="_x0000_s27474" name="think-cell Slide" r:id="rId9" imgW="270" imgH="270" progId="TCLayout.ActiveDocument.1">
+                <p:oleObj spid="_x0000_s27476" name="think-cell Slide" r:id="rId9" imgW="270" imgH="270" progId="TCLayout.ActiveDocument.1">
                   <p:embed/>
                 </p:oleObj>
               </mc:Choice>
@@ -4544,7 +4542,7 @@
           <a:graphicData uri="http://schemas.openxmlformats.org/presentationml/2006/ole">
             <mc:AlternateContent xmlns:mc="http://schemas.openxmlformats.org/markup-compatibility/2006">
               <mc:Choice xmlns:v="urn:schemas-microsoft-com:vml" Requires="v">
-                <p:oleObj spid="_x0000_s28498" name="think-cell Slide" r:id="rId9" imgW="270" imgH="270" progId="TCLayout.ActiveDocument.1">
+                <p:oleObj spid="_x0000_s28500" name="think-cell Slide" r:id="rId9" imgW="270" imgH="270" progId="TCLayout.ActiveDocument.1">
                   <p:embed/>
                 </p:oleObj>
               </mc:Choice>
@@ -4909,7 +4907,7 @@
           <a:graphicData uri="http://schemas.openxmlformats.org/presentationml/2006/ole">
             <mc:AlternateContent xmlns:mc="http://schemas.openxmlformats.org/markup-compatibility/2006">
               <mc:Choice xmlns:v="urn:schemas-microsoft-com:vml" Requires="v">
-                <p:oleObj spid="_x0000_s29522" name="think-cell Slide" r:id="rId8" imgW="270" imgH="270" progId="TCLayout.ActiveDocument.1">
+                <p:oleObj spid="_x0000_s29524" name="think-cell Slide" r:id="rId8" imgW="270" imgH="270" progId="TCLayout.ActiveDocument.1">
                   <p:embed/>
                 </p:oleObj>
               </mc:Choice>
@@ -5175,7 +5173,7 @@
           <a:graphicData uri="http://schemas.openxmlformats.org/presentationml/2006/ole">
             <mc:AlternateContent xmlns:mc="http://schemas.openxmlformats.org/markup-compatibility/2006">
               <mc:Choice xmlns:v="urn:schemas-microsoft-com:vml" Requires="v">
-                <p:oleObj spid="_x0000_s12114" name="think-cell Slide" r:id="rId9" imgW="270" imgH="270" progId="TCLayout.ActiveDocument.1">
+                <p:oleObj spid="_x0000_s12116" name="think-cell Slide" r:id="rId9" imgW="270" imgH="270" progId="TCLayout.ActiveDocument.1">
                   <p:embed/>
                 </p:oleObj>
               </mc:Choice>
@@ -5565,7 +5563,7 @@
           <a:graphicData uri="http://schemas.openxmlformats.org/presentationml/2006/ole">
             <mc:AlternateContent xmlns:mc="http://schemas.openxmlformats.org/markup-compatibility/2006">
               <mc:Choice xmlns:v="urn:schemas-microsoft-com:vml" Requires="v">
-                <p:oleObj spid="_x0000_s30546" name="think-cell Slide" r:id="rId10" imgW="270" imgH="270" progId="TCLayout.ActiveDocument.1">
+                <p:oleObj spid="_x0000_s30548" name="think-cell Slide" r:id="rId10" imgW="270" imgH="270" progId="TCLayout.ActiveDocument.1">
                   <p:embed/>
                 </p:oleObj>
               </mc:Choice>
@@ -5919,7 +5917,7 @@
           <a:graphicData uri="http://schemas.openxmlformats.org/presentationml/2006/ole">
             <mc:AlternateContent xmlns:mc="http://schemas.openxmlformats.org/markup-compatibility/2006">
               <mc:Choice xmlns:v="urn:schemas-microsoft-com:vml" Requires="v">
-                <p:oleObj spid="_x0000_s31570" name="think-cell Slide" r:id="rId10" imgW="270" imgH="270" progId="TCLayout.ActiveDocument.1">
+                <p:oleObj spid="_x0000_s31572" name="think-cell Slide" r:id="rId10" imgW="270" imgH="270" progId="TCLayout.ActiveDocument.1">
                   <p:embed/>
                 </p:oleObj>
               </mc:Choice>
@@ -6343,7 +6341,6 @@
             <p:custDataLst>
               <p:tags r:id="rId2"/>
             </p:custDataLst>
-            <p:extLst/>
           </p:nvPr>
         </p:nvGraphicFramePr>
         <p:xfrm>
@@ -6354,7 +6351,7 @@
           <a:graphicData uri="http://schemas.openxmlformats.org/presentationml/2006/ole">
             <mc:AlternateContent xmlns:mc="http://schemas.openxmlformats.org/markup-compatibility/2006">
               <mc:Choice xmlns:v="urn:schemas-microsoft-com:vml" Requires="v">
-                <p:oleObj spid="_x0000_s48950" name="think-cell Slide" r:id="rId9" imgW="270" imgH="270" progId="TCLayout.ActiveDocument.1">
+                <p:oleObj spid="_x0000_s48952" name="think-cell Slide" r:id="rId9" imgW="270" imgH="270" progId="TCLayout.ActiveDocument.1">
                   <p:embed/>
                 </p:oleObj>
               </mc:Choice>
@@ -6729,7 +6726,6 @@
             <p:custDataLst>
               <p:tags r:id="rId2"/>
             </p:custDataLst>
-            <p:extLst/>
           </p:nvPr>
         </p:nvGraphicFramePr>
         <p:xfrm>
@@ -6740,7 +6736,7 @@
           <a:graphicData uri="http://schemas.openxmlformats.org/presentationml/2006/ole">
             <mc:AlternateContent xmlns:mc="http://schemas.openxmlformats.org/markup-compatibility/2006">
               <mc:Choice xmlns:v="urn:schemas-microsoft-com:vml" Requires="v">
-                <p:oleObj spid="_x0000_s55094" name="think-cell Slide" r:id="rId11" imgW="270" imgH="270" progId="TCLayout.ActiveDocument.1">
+                <p:oleObj spid="_x0000_s55096" name="think-cell Slide" r:id="rId11" imgW="270" imgH="270" progId="TCLayout.ActiveDocument.1">
                   <p:embed/>
                 </p:oleObj>
               </mc:Choice>
@@ -7218,7 +7214,6 @@
             <p:custDataLst>
               <p:tags r:id="rId2"/>
             </p:custDataLst>
-            <p:extLst/>
           </p:nvPr>
         </p:nvGraphicFramePr>
         <p:xfrm>
@@ -7229,7 +7224,7 @@
           <a:graphicData uri="http://schemas.openxmlformats.org/presentationml/2006/ole">
             <mc:AlternateContent xmlns:mc="http://schemas.openxmlformats.org/markup-compatibility/2006">
               <mc:Choice xmlns:v="urn:schemas-microsoft-com:vml" Requires="v">
-                <p:oleObj spid="_x0000_s56118" name="think-cell Slide" r:id="rId10" imgW="270" imgH="270" progId="TCLayout.ActiveDocument.1">
+                <p:oleObj spid="_x0000_s56120" name="think-cell Slide" r:id="rId10" imgW="270" imgH="270" progId="TCLayout.ActiveDocument.1">
                   <p:embed/>
                 </p:oleObj>
               </mc:Choice>
@@ -7656,7 +7651,6 @@
             <p:custDataLst>
               <p:tags r:id="rId2"/>
             </p:custDataLst>
-            <p:extLst/>
           </p:nvPr>
         </p:nvGraphicFramePr>
         <p:xfrm>
@@ -7667,7 +7661,7 @@
           <a:graphicData uri="http://schemas.openxmlformats.org/presentationml/2006/ole">
             <mc:AlternateContent xmlns:mc="http://schemas.openxmlformats.org/markup-compatibility/2006">
               <mc:Choice xmlns:v="urn:schemas-microsoft-com:vml" Requires="v">
-                <p:oleObj spid="_x0000_s59190" name="think-cell Slide" r:id="rId11" imgW="270" imgH="270" progId="TCLayout.ActiveDocument.1">
+                <p:oleObj spid="_x0000_s59192" name="think-cell Slide" r:id="rId11" imgW="270" imgH="270" progId="TCLayout.ActiveDocument.1">
                   <p:embed/>
                 </p:oleObj>
               </mc:Choice>
@@ -8196,7 +8190,6 @@
             <p:custDataLst>
               <p:tags r:id="rId2"/>
             </p:custDataLst>
-            <p:extLst/>
           </p:nvPr>
         </p:nvGraphicFramePr>
         <p:xfrm>
@@ -8207,7 +8200,7 @@
           <a:graphicData uri="http://schemas.openxmlformats.org/presentationml/2006/ole">
             <mc:AlternateContent xmlns:mc="http://schemas.openxmlformats.org/markup-compatibility/2006">
               <mc:Choice xmlns:v="urn:schemas-microsoft-com:vml" Requires="v">
-                <p:oleObj spid="_x0000_s60214" name="think-cell Slide" r:id="rId9" imgW="270" imgH="270" progId="TCLayout.ActiveDocument.1">
+                <p:oleObj spid="_x0000_s60216" name="think-cell Slide" r:id="rId9" imgW="270" imgH="270" progId="TCLayout.ActiveDocument.1">
                   <p:embed/>
                 </p:oleObj>
               </mc:Choice>
@@ -8582,7 +8575,6 @@
             <p:custDataLst>
               <p:tags r:id="rId2"/>
             </p:custDataLst>
-            <p:extLst/>
           </p:nvPr>
         </p:nvGraphicFramePr>
         <p:xfrm>
@@ -8593,7 +8585,7 @@
           <a:graphicData uri="http://schemas.openxmlformats.org/presentationml/2006/ole">
             <mc:AlternateContent xmlns:mc="http://schemas.openxmlformats.org/markup-compatibility/2006">
               <mc:Choice xmlns:v="urn:schemas-microsoft-com:vml" Requires="v">
-                <p:oleObj spid="_x0000_s63286" name="think-cell Slide" r:id="rId7" imgW="270" imgH="270" progId="TCLayout.ActiveDocument.1">
+                <p:oleObj spid="_x0000_s63288" name="think-cell Slide" r:id="rId7" imgW="270" imgH="270" progId="TCLayout.ActiveDocument.1">
                   <p:embed/>
                 </p:oleObj>
               </mc:Choice>
@@ -8872,7 +8864,6 @@
             <p:custDataLst>
               <p:tags r:id="rId2"/>
             </p:custDataLst>
-            <p:extLst/>
           </p:nvPr>
         </p:nvGraphicFramePr>
         <p:xfrm>
@@ -8883,7 +8874,7 @@
           <a:graphicData uri="http://schemas.openxmlformats.org/presentationml/2006/ole">
             <mc:AlternateContent xmlns:mc="http://schemas.openxmlformats.org/markup-compatibility/2006">
               <mc:Choice xmlns:v="urn:schemas-microsoft-com:vml" Requires="v">
-                <p:oleObj spid="_x0000_s67382" name="think-cell Slide" r:id="rId8" imgW="270" imgH="270" progId="TCLayout.ActiveDocument.1">
+                <p:oleObj spid="_x0000_s67384" name="think-cell Slide" r:id="rId8" imgW="270" imgH="270" progId="TCLayout.ActiveDocument.1">
                   <p:embed/>
                 </p:oleObj>
               </mc:Choice>
@@ -9149,7 +9140,7 @@
           <a:graphicData uri="http://schemas.openxmlformats.org/presentationml/2006/ole">
             <mc:AlternateContent xmlns:mc="http://schemas.openxmlformats.org/markup-compatibility/2006">
               <mc:Choice xmlns:v="urn:schemas-microsoft-com:vml" Requires="v">
-                <p:oleObj spid="_x0000_s13138" name="think-cell Slide" r:id="rId9" imgW="270" imgH="270" progId="TCLayout.ActiveDocument.1">
+                <p:oleObj spid="_x0000_s13140" name="think-cell Slide" r:id="rId9" imgW="270" imgH="270" progId="TCLayout.ActiveDocument.1">
                   <p:embed/>
                 </p:oleObj>
               </mc:Choice>
@@ -9539,7 +9530,7 @@
           <a:graphicData uri="http://schemas.openxmlformats.org/presentationml/2006/ole">
             <mc:AlternateContent xmlns:mc="http://schemas.openxmlformats.org/markup-compatibility/2006">
               <mc:Choice xmlns:v="urn:schemas-microsoft-com:vml" Requires="v">
-                <p:oleObj spid="_x0000_s14162" name="think-cell Slide" r:id="rId9" imgW="270" imgH="270" progId="TCLayout.ActiveDocument.1">
+                <p:oleObj spid="_x0000_s14164" name="think-cell Slide" r:id="rId9" imgW="270" imgH="270" progId="TCLayout.ActiveDocument.1">
                   <p:embed/>
                 </p:oleObj>
               </mc:Choice>
@@ -9929,7 +9920,7 @@
           <a:graphicData uri="http://schemas.openxmlformats.org/presentationml/2006/ole">
             <mc:AlternateContent xmlns:mc="http://schemas.openxmlformats.org/markup-compatibility/2006">
               <mc:Choice xmlns:v="urn:schemas-microsoft-com:vml" Requires="v">
-                <p:oleObj spid="_x0000_s15186" name="think-cell Slide" r:id="rId9" imgW="270" imgH="270" progId="TCLayout.ActiveDocument.1">
+                <p:oleObj spid="_x0000_s15188" name="think-cell Slide" r:id="rId9" imgW="270" imgH="270" progId="TCLayout.ActiveDocument.1">
                   <p:embed/>
                 </p:oleObj>
               </mc:Choice>
@@ -10319,7 +10310,7 @@
           <a:graphicData uri="http://schemas.openxmlformats.org/presentationml/2006/ole">
             <mc:AlternateContent xmlns:mc="http://schemas.openxmlformats.org/markup-compatibility/2006">
               <mc:Choice xmlns:v="urn:schemas-microsoft-com:vml" Requires="v">
-                <p:oleObj spid="_x0000_s16210" name="think-cell Slide" r:id="rId9" imgW="270" imgH="270" progId="TCLayout.ActiveDocument.1">
+                <p:oleObj spid="_x0000_s16212" name="think-cell Slide" r:id="rId9" imgW="270" imgH="270" progId="TCLayout.ActiveDocument.1">
                   <p:embed/>
                 </p:oleObj>
               </mc:Choice>
@@ -10709,7 +10700,7 @@
           <a:graphicData uri="http://schemas.openxmlformats.org/presentationml/2006/ole">
             <mc:AlternateContent xmlns:mc="http://schemas.openxmlformats.org/markup-compatibility/2006">
               <mc:Choice xmlns:v="urn:schemas-microsoft-com:vml" Requires="v">
-                <p:oleObj spid="_x0000_s17234" name="think-cell Slide" r:id="rId11" imgW="270" imgH="270" progId="TCLayout.ActiveDocument.1">
+                <p:oleObj spid="_x0000_s17236" name="think-cell Slide" r:id="rId11" imgW="270" imgH="270" progId="TCLayout.ActiveDocument.1">
                   <p:embed/>
                 </p:oleObj>
               </mc:Choice>
@@ -11202,7 +11193,7 @@
           <a:graphicData uri="http://schemas.openxmlformats.org/presentationml/2006/ole">
             <mc:AlternateContent xmlns:mc="http://schemas.openxmlformats.org/markup-compatibility/2006">
               <mc:Choice xmlns:v="urn:schemas-microsoft-com:vml" Requires="v">
-                <p:oleObj spid="_x0000_s18258" name="think-cell Slide" r:id="rId10" imgW="270" imgH="270" progId="TCLayout.ActiveDocument.1">
+                <p:oleObj spid="_x0000_s18260" name="think-cell Slide" r:id="rId10" imgW="270" imgH="270" progId="TCLayout.ActiveDocument.1">
                   <p:embed/>
                 </p:oleObj>
               </mc:Choice>
@@ -11644,7 +11635,7 @@
           <a:graphicData uri="http://schemas.openxmlformats.org/presentationml/2006/ole">
             <mc:AlternateContent xmlns:mc="http://schemas.openxmlformats.org/markup-compatibility/2006">
               <mc:Choice xmlns:v="urn:schemas-microsoft-com:vml" Requires="v">
-                <p:oleObj spid="_x0000_s19282" name="think-cell Slide" r:id="rId12" imgW="270" imgH="270" progId="TCLayout.ActiveDocument.1">
+                <p:oleObj spid="_x0000_s19284" name="think-cell Slide" r:id="rId12" imgW="270" imgH="270" progId="TCLayout.ActiveDocument.1">
                   <p:embed/>
                 </p:oleObj>
               </mc:Choice>
@@ -12215,7 +12206,7 @@
           <a:graphicData uri="http://schemas.openxmlformats.org/presentationml/2006/ole">
             <mc:AlternateContent xmlns:mc="http://schemas.openxmlformats.org/markup-compatibility/2006">
               <mc:Choice xmlns:v="urn:schemas-microsoft-com:vml" Requires="v">
-                <p:oleObj spid="_x0000_s10071" name="think-cell Slide" r:id="rId30" imgW="270" imgH="270" progId="TCLayout.ActiveDocument.1">
+                <p:oleObj spid="_x0000_s10073" name="think-cell Slide" r:id="rId30" imgW="270" imgH="270" progId="TCLayout.ActiveDocument.1">
                   <p:embed/>
                 </p:oleObj>
               </mc:Choice>
@@ -12775,7 +12766,6 @@
             <p:custDataLst>
               <p:tags r:id="rId10"/>
             </p:custDataLst>
-            <p:extLst/>
           </p:nvPr>
         </p:nvGraphicFramePr>
         <p:xfrm>
@@ -12786,7 +12776,7 @@
           <a:graphicData uri="http://schemas.openxmlformats.org/presentationml/2006/ole">
             <mc:AlternateContent xmlns:mc="http://schemas.openxmlformats.org/markup-compatibility/2006">
               <mc:Choice xmlns:v="urn:schemas-microsoft-com:vml" Requires="v">
-                <p:oleObj spid="_x0000_s47926" name="think-cell Slide" r:id="rId15" imgW="270" imgH="270" progId="TCLayout.ActiveDocument.1">
+                <p:oleObj spid="_x0000_s47928" name="think-cell Slide" r:id="rId15" imgW="270" imgH="270" progId="TCLayout.ActiveDocument.1">
                   <p:embed/>
                 </p:oleObj>
               </mc:Choice>
@@ -13889,7 +13879,7 @@
           <a:lstStyle/>
           <a:p>
             <a:r>
-              <a:rPr lang="en-US" sz="1600">
+              <a:rPr lang="en-US" sz="1600" dirty="0">
                 <a:solidFill>
                   <a:schemeClr val="tx1">
                     <a:lumMod val="60000"/>
@@ -13903,7 +13893,7 @@
               <a:t>3</a:t>
             </a:r>
             <a:r>
-              <a:rPr lang="en-US" sz="1600" baseline="30000">
+              <a:rPr lang="en-US" sz="1600" baseline="30000" dirty="0">
                 <a:solidFill>
                   <a:schemeClr val="tx1">
                     <a:lumMod val="60000"/>
@@ -13917,7 +13907,7 @@
               <a:t>rd</a:t>
             </a:r>
             <a:r>
-              <a:rPr lang="en-US" sz="1600">
+              <a:rPr lang="en-US" sz="1600" dirty="0">
                 <a:solidFill>
                   <a:schemeClr val="tx1">
                     <a:lumMod val="60000"/>
@@ -16081,48 +16071,33 @@
           <a:lstStyle/>
           <a:p>
             <a:r>
-              <a:rPr lang="en-US" sz="1200">
+              <a:rPr lang="en-US" sz="1200" dirty="0">
                 <a:latin typeface="Calibri"/>
                 <a:ea typeface="Segoe UI" pitchFamily="34" charset="0"/>
                 <a:cs typeface="Calibri"/>
               </a:rPr>
-              <a:t>SQL</a:t>
+              <a:t>Azure</a:t>
             </a:r>
-            <a:br>
-              <a:rPr lang="en-US" sz="1200">
+          </a:p>
+          <a:p>
+            <a:r>
+              <a:rPr lang="en-US" sz="1200" dirty="0">
                 <a:latin typeface="Calibri"/>
                 <a:ea typeface="Segoe UI" pitchFamily="34" charset="0"/>
                 <a:cs typeface="Calibri"/>
               </a:rPr>
-            </a:br>
+              <a:t>Synapse</a:t>
+            </a:r>
+          </a:p>
+          <a:p>
             <a:r>
-              <a:rPr lang="en-US" sz="1200">
+              <a:rPr lang="en-US" sz="1200" dirty="0">
                 <a:latin typeface="Calibri"/>
                 <a:ea typeface="Segoe UI" pitchFamily="34" charset="0"/>
                 <a:cs typeface="Calibri"/>
               </a:rPr>
-              <a:t>Data</a:t>
+              <a:t>Analytics</a:t>
             </a:r>
-            <a:br>
-              <a:rPr lang="en-US" sz="1200">
-                <a:latin typeface="Calibri"/>
-                <a:ea typeface="Segoe UI" pitchFamily="34" charset="0"/>
-                <a:cs typeface="Calibri"/>
-              </a:rPr>
-            </a:br>
-            <a:r>
-              <a:rPr lang="en-US" sz="1200">
-                <a:latin typeface="Calibri"/>
-                <a:ea typeface="Segoe UI" pitchFamily="34" charset="0"/>
-                <a:cs typeface="Calibri"/>
-              </a:rPr>
-              <a:t>Warehouse</a:t>
-            </a:r>
-            <a:endParaRPr lang="en-US" sz="1200" dirty="0">
-              <a:latin typeface="Calibri"/>
-              <a:ea typeface="Segoe UI" pitchFamily="34" charset="0"/>
-              <a:cs typeface="Calibri"/>
-            </a:endParaRPr>
           </a:p>
         </p:txBody>
       </p:sp>
@@ -22231,12 +22206,9 @@
 </file>
 
 <file path=customXml/item1.xml><?xml version="1.0" encoding="utf-8"?>
-<?mso-contentType ?>
-<FormTemplates xmlns="http://schemas.microsoft.com/sharepoint/v3/contenttype/forms">
-  <Display>DocumentLibraryForm</Display>
-  <Edit>DocumentLibraryForm</Edit>
-  <New>DocumentLibraryForm</New>
-</FormTemplates>
+<p:properties xmlns:p="http://schemas.microsoft.com/office/2006/metadata/properties" xmlns:xsi="http://www.w3.org/2001/XMLSchema-instance" xmlns:pc="http://schemas.microsoft.com/office/infopath/2007/PartnerControls">
+  <documentManagement/>
+</p:properties>
 </file>
 
 <file path=customXml/item2.xml><?xml version="1.0" encoding="utf-8"?>
@@ -22380,15 +22352,26 @@
 </file>
 
 <file path=customXml/item3.xml><?xml version="1.0" encoding="utf-8"?>
-<p:properties xmlns:p="http://schemas.microsoft.com/office/2006/metadata/properties" xmlns:xsi="http://www.w3.org/2001/XMLSchema-instance" xmlns:pc="http://schemas.microsoft.com/office/infopath/2007/PartnerControls">
-  <documentManagement/>
-</p:properties>
+<?mso-contentType ?>
+<FormTemplates xmlns="http://schemas.microsoft.com/sharepoint/v3/contenttype/forms">
+  <Display>DocumentLibraryForm</Display>
+  <Edit>DocumentLibraryForm</Edit>
+  <New>DocumentLibraryForm</New>
+</FormTemplates>
 </file>
 
 <file path=customXml/itemProps1.xml><?xml version="1.0" encoding="utf-8"?>
-<ds:datastoreItem xmlns:ds="http://schemas.openxmlformats.org/officeDocument/2006/customXml" ds:itemID="{3301510A-9EC9-404A-818F-BE10941C0925}">
+<ds:datastoreItem xmlns:ds="http://schemas.openxmlformats.org/officeDocument/2006/customXml" ds:itemID="{267EEB37-FBC8-444E-88CF-DF8C59083097}">
   <ds:schemaRefs>
-    <ds:schemaRef ds:uri="http://schemas.microsoft.com/sharepoint/v3/contenttype/forms"/>
+    <ds:schemaRef ds:uri="http://purl.org/dc/terms/"/>
+    <ds:schemaRef ds:uri="b1eac095-f4ed-4ca2-88ef-95980cb65d0f"/>
+    <ds:schemaRef ds:uri="http://schemas.microsoft.com/office/2006/documentManagement/types"/>
+    <ds:schemaRef ds:uri="http://schemas.microsoft.com/office/infopath/2007/PartnerControls"/>
+    <ds:schemaRef ds:uri="http://purl.org/dc/elements/1.1/"/>
+    <ds:schemaRef ds:uri="http://schemas.microsoft.com/office/2006/metadata/properties"/>
+    <ds:schemaRef ds:uri="http://schemas.openxmlformats.org/package/2006/metadata/core-properties"/>
+    <ds:schemaRef ds:uri="http://www.w3.org/XML/1998/namespace"/>
+    <ds:schemaRef ds:uri="http://purl.org/dc/dcmitype/"/>
   </ds:schemaRefs>
 </ds:datastoreItem>
 </file>
@@ -22412,17 +22395,9 @@
 </file>
 
 <file path=customXml/itemProps3.xml><?xml version="1.0" encoding="utf-8"?>
-<ds:datastoreItem xmlns:ds="http://schemas.openxmlformats.org/officeDocument/2006/customXml" ds:itemID="{267EEB37-FBC8-444E-88CF-DF8C59083097}">
+<ds:datastoreItem xmlns:ds="http://schemas.openxmlformats.org/officeDocument/2006/customXml" ds:itemID="{3301510A-9EC9-404A-818F-BE10941C0925}">
   <ds:schemaRefs>
-    <ds:schemaRef ds:uri="http://purl.org/dc/terms/"/>
-    <ds:schemaRef ds:uri="b1eac095-f4ed-4ca2-88ef-95980cb65d0f"/>
-    <ds:schemaRef ds:uri="http://schemas.microsoft.com/office/2006/documentManagement/types"/>
-    <ds:schemaRef ds:uri="http://schemas.microsoft.com/office/infopath/2007/PartnerControls"/>
-    <ds:schemaRef ds:uri="http://purl.org/dc/elements/1.1/"/>
-    <ds:schemaRef ds:uri="http://schemas.microsoft.com/office/2006/metadata/properties"/>
-    <ds:schemaRef ds:uri="http://schemas.openxmlformats.org/package/2006/metadata/core-properties"/>
-    <ds:schemaRef ds:uri="http://www.w3.org/XML/1998/namespace"/>
-    <ds:schemaRef ds:uri="http://purl.org/dc/dcmitype/"/>
+    <ds:schemaRef ds:uri="http://schemas.microsoft.com/sharepoint/v3/contenttype/forms"/>
   </ds:schemaRefs>
 </ds:datastoreItem>
 </file>
</xml_diff>